<commit_message>
corrections in model and control md
</commit_message>
<xml_diff>
--- a/Documentation/Images/Figures_Tutorial.pptx
+++ b/Documentation/Images/Figures_Tutorial.pptx
@@ -12,6 +12,7 @@
     <p:sldId id="260" r:id="rId6"/>
     <p:sldId id="261" r:id="rId7"/>
     <p:sldId id="262" r:id="rId8"/>
+    <p:sldId id="263" r:id="rId9"/>
   </p:sldIdLst>
   <p:sldSz cx="12192000" cy="6858000"/>
   <p:notesSz cx="6858000" cy="9144000"/>
@@ -971,7 +972,7 @@
           <a:p>
             <a:fld id="{477A5ACE-C18D-4F25-B1CE-78B934F35ED5}" type="datetimeFigureOut">
               <a:rPr lang="es-ES" smtClean="0"/>
-              <a:t>18/12/2021</a:t>
+              <a:t>19/10/2022</a:t>
             </a:fld>
             <a:endParaRPr lang="es-ES" dirty="0"/>
           </a:p>
@@ -1169,7 +1170,7 @@
           <a:p>
             <a:fld id="{477A5ACE-C18D-4F25-B1CE-78B934F35ED5}" type="datetimeFigureOut">
               <a:rPr lang="es-ES" smtClean="0"/>
-              <a:t>18/12/2021</a:t>
+              <a:t>19/10/2022</a:t>
             </a:fld>
             <a:endParaRPr lang="es-ES" dirty="0"/>
           </a:p>
@@ -1377,7 +1378,7 @@
           <a:p>
             <a:fld id="{477A5ACE-C18D-4F25-B1CE-78B934F35ED5}" type="datetimeFigureOut">
               <a:rPr lang="es-ES" smtClean="0"/>
-              <a:t>18/12/2021</a:t>
+              <a:t>19/10/2022</a:t>
             </a:fld>
             <a:endParaRPr lang="es-ES" dirty="0"/>
           </a:p>
@@ -1575,7 +1576,7 @@
           <a:p>
             <a:fld id="{477A5ACE-C18D-4F25-B1CE-78B934F35ED5}" type="datetimeFigureOut">
               <a:rPr lang="es-ES" smtClean="0"/>
-              <a:t>18/12/2021</a:t>
+              <a:t>19/10/2022</a:t>
             </a:fld>
             <a:endParaRPr lang="es-ES" dirty="0"/>
           </a:p>
@@ -1850,7 +1851,7 @@
           <a:p>
             <a:fld id="{477A5ACE-C18D-4F25-B1CE-78B934F35ED5}" type="datetimeFigureOut">
               <a:rPr lang="es-ES" smtClean="0"/>
-              <a:t>18/12/2021</a:t>
+              <a:t>19/10/2022</a:t>
             </a:fld>
             <a:endParaRPr lang="es-ES" dirty="0"/>
           </a:p>
@@ -2115,7 +2116,7 @@
           <a:p>
             <a:fld id="{477A5ACE-C18D-4F25-B1CE-78B934F35ED5}" type="datetimeFigureOut">
               <a:rPr lang="es-ES" smtClean="0"/>
-              <a:t>18/12/2021</a:t>
+              <a:t>19/10/2022</a:t>
             </a:fld>
             <a:endParaRPr lang="es-ES" dirty="0"/>
           </a:p>
@@ -2527,7 +2528,7 @@
           <a:p>
             <a:fld id="{477A5ACE-C18D-4F25-B1CE-78B934F35ED5}" type="datetimeFigureOut">
               <a:rPr lang="es-ES" smtClean="0"/>
-              <a:t>18/12/2021</a:t>
+              <a:t>19/10/2022</a:t>
             </a:fld>
             <a:endParaRPr lang="es-ES" dirty="0"/>
           </a:p>
@@ -2668,7 +2669,7 @@
           <a:p>
             <a:fld id="{477A5ACE-C18D-4F25-B1CE-78B934F35ED5}" type="datetimeFigureOut">
               <a:rPr lang="es-ES" smtClean="0"/>
-              <a:t>18/12/2021</a:t>
+              <a:t>19/10/2022</a:t>
             </a:fld>
             <a:endParaRPr lang="es-ES" dirty="0"/>
           </a:p>
@@ -2781,7 +2782,7 @@
           <a:p>
             <a:fld id="{477A5ACE-C18D-4F25-B1CE-78B934F35ED5}" type="datetimeFigureOut">
               <a:rPr lang="es-ES" smtClean="0"/>
-              <a:t>18/12/2021</a:t>
+              <a:t>19/10/2022</a:t>
             </a:fld>
             <a:endParaRPr lang="es-ES" dirty="0"/>
           </a:p>
@@ -3092,7 +3093,7 @@
           <a:p>
             <a:fld id="{477A5ACE-C18D-4F25-B1CE-78B934F35ED5}" type="datetimeFigureOut">
               <a:rPr lang="es-ES" smtClean="0"/>
-              <a:t>18/12/2021</a:t>
+              <a:t>19/10/2022</a:t>
             </a:fld>
             <a:endParaRPr lang="es-ES" dirty="0"/>
           </a:p>
@@ -3380,7 +3381,7 @@
           <a:p>
             <a:fld id="{477A5ACE-C18D-4F25-B1CE-78B934F35ED5}" type="datetimeFigureOut">
               <a:rPr lang="es-ES" smtClean="0"/>
-              <a:t>18/12/2021</a:t>
+              <a:t>19/10/2022</a:t>
             </a:fld>
             <a:endParaRPr lang="es-ES" dirty="0"/>
           </a:p>
@@ -3621,7 +3622,7 @@
           <a:p>
             <a:fld id="{477A5ACE-C18D-4F25-B1CE-78B934F35ED5}" type="datetimeFigureOut">
               <a:rPr lang="es-ES" smtClean="0"/>
-              <a:t>18/12/2021</a:t>
+              <a:t>19/10/2022</a:t>
             </a:fld>
             <a:endParaRPr lang="es-ES" dirty="0"/>
           </a:p>
@@ -8573,6 +8574,1079 @@
 </p:sld>
 </file>
 
+<file path=ppt/slides/slide8.xml><?xml version="1.0" encoding="utf-8"?>
+<p:sld xmlns:a="http://schemas.openxmlformats.org/drawingml/2006/main" xmlns:r="http://schemas.openxmlformats.org/officeDocument/2006/relationships" xmlns:p="http://schemas.openxmlformats.org/presentationml/2006/main">
+  <p:cSld>
+    <p:spTree>
+      <p:nvGrpSpPr>
+        <p:cNvPr id="1" name=""/>
+        <p:cNvGrpSpPr/>
+        <p:nvPr/>
+      </p:nvGrpSpPr>
+      <p:grpSpPr>
+        <a:xfrm>
+          <a:off x="0" y="0"/>
+          <a:ext cx="0" cy="0"/>
+          <a:chOff x="0" y="0"/>
+          <a:chExt cx="0" cy="0"/>
+        </a:xfrm>
+      </p:grpSpPr>
+      <p:cxnSp>
+        <p:nvCxnSpPr>
+          <p:cNvPr id="7" name="Conector recto de flecha 6">
+            <a:extLst>
+              <a:ext uri="{FF2B5EF4-FFF2-40B4-BE49-F238E27FC236}">
+                <a16:creationId xmlns:a16="http://schemas.microsoft.com/office/drawing/2014/main" id="{5DA8BA08-98F3-4B12-AB35-10F82E63D7D0}"/>
+              </a:ext>
+            </a:extLst>
+          </p:cNvPr>
+          <p:cNvCxnSpPr>
+            <a:cxnSpLocks/>
+          </p:cNvCxnSpPr>
+          <p:nvPr/>
+        </p:nvCxnSpPr>
+        <p:spPr>
+          <a:xfrm>
+            <a:off x="4619023" y="4301120"/>
+            <a:ext cx="2341309" cy="1"/>
+          </a:xfrm>
+          <a:prstGeom prst="straightConnector1">
+            <a:avLst/>
+          </a:prstGeom>
+          <a:ln w="57150">
+            <a:solidFill>
+              <a:srgbClr val="FF0000"/>
+            </a:solidFill>
+            <a:tailEnd type="triangle"/>
+          </a:ln>
+        </p:spPr>
+        <p:style>
+          <a:lnRef idx="1">
+            <a:schemeClr val="accent1"/>
+          </a:lnRef>
+          <a:fillRef idx="0">
+            <a:schemeClr val="accent1"/>
+          </a:fillRef>
+          <a:effectRef idx="0">
+            <a:schemeClr val="accent1"/>
+          </a:effectRef>
+          <a:fontRef idx="minor">
+            <a:schemeClr val="tx1"/>
+          </a:fontRef>
+        </p:style>
+      </p:cxnSp>
+      <p:sp>
+        <p:nvSpPr>
+          <p:cNvPr id="8" name="Elipse 7">
+            <a:extLst>
+              <a:ext uri="{FF2B5EF4-FFF2-40B4-BE49-F238E27FC236}">
+                <a16:creationId xmlns:a16="http://schemas.microsoft.com/office/drawing/2014/main" id="{99244EB1-158A-4D55-98F4-172650970AF5}"/>
+              </a:ext>
+            </a:extLst>
+          </p:cNvPr>
+          <p:cNvSpPr/>
+          <p:nvPr/>
+        </p:nvSpPr>
+        <p:spPr>
+          <a:xfrm>
+            <a:off x="6960332" y="3396246"/>
+            <a:ext cx="3200400" cy="1809750"/>
+          </a:xfrm>
+          <a:prstGeom prst="ellipse">
+            <a:avLst/>
+          </a:prstGeom>
+          <a:noFill/>
+          <a:ln w="38100"/>
+        </p:spPr>
+        <p:style>
+          <a:lnRef idx="2">
+            <a:schemeClr val="accent1">
+              <a:shade val="50000"/>
+            </a:schemeClr>
+          </a:lnRef>
+          <a:fillRef idx="1">
+            <a:schemeClr val="accent1"/>
+          </a:fillRef>
+          <a:effectRef idx="0">
+            <a:schemeClr val="accent1"/>
+          </a:effectRef>
+          <a:fontRef idx="minor">
+            <a:schemeClr val="lt1"/>
+          </a:fontRef>
+        </p:style>
+        <p:txBody>
+          <a:bodyPr rtlCol="0" anchor="ctr"/>
+          <a:lstStyle/>
+          <a:p>
+            <a:pPr algn="ctr"/>
+            <a:endParaRPr lang="es-ES" dirty="0"/>
+          </a:p>
+        </p:txBody>
+      </p:sp>
+      <p:sp>
+        <p:nvSpPr>
+          <p:cNvPr id="10" name="CuadroTexto 9">
+            <a:extLst>
+              <a:ext uri="{FF2B5EF4-FFF2-40B4-BE49-F238E27FC236}">
+                <a16:creationId xmlns:a16="http://schemas.microsoft.com/office/drawing/2014/main" id="{259A914E-1F70-4883-A69A-B870D4892089}"/>
+              </a:ext>
+            </a:extLst>
+          </p:cNvPr>
+          <p:cNvSpPr txBox="1"/>
+          <p:nvPr/>
+        </p:nvSpPr>
+        <p:spPr>
+          <a:xfrm>
+            <a:off x="4987170" y="5529765"/>
+            <a:ext cx="1056379" cy="461665"/>
+          </a:xfrm>
+          <a:prstGeom prst="rect">
+            <a:avLst/>
+          </a:prstGeom>
+          <a:noFill/>
+        </p:spPr>
+        <p:txBody>
+          <a:bodyPr wrap="none" rtlCol="0">
+            <a:spAutoFit/>
+          </a:bodyPr>
+          <a:lstStyle/>
+          <a:p>
+            <a:r>
+              <a:rPr lang="ca-ES" sz="2400" b="1" dirty="0">
+                <a:solidFill>
+                  <a:srgbClr val="FF0000"/>
+                </a:solidFill>
+              </a:rPr>
+              <a:t>/odom</a:t>
+            </a:r>
+            <a:endParaRPr lang="es-ES" sz="2400" b="1" dirty="0">
+              <a:solidFill>
+                <a:srgbClr val="FF0000"/>
+              </a:solidFill>
+            </a:endParaRPr>
+          </a:p>
+        </p:txBody>
+      </p:sp>
+      <p:sp>
+        <p:nvSpPr>
+          <p:cNvPr id="12" name="CuadroTexto 11">
+            <a:extLst>
+              <a:ext uri="{FF2B5EF4-FFF2-40B4-BE49-F238E27FC236}">
+                <a16:creationId xmlns:a16="http://schemas.microsoft.com/office/drawing/2014/main" id="{32501159-C072-4A91-B0A4-05E4452DF559}"/>
+              </a:ext>
+            </a:extLst>
+          </p:cNvPr>
+          <p:cNvSpPr txBox="1"/>
+          <p:nvPr/>
+        </p:nvSpPr>
+        <p:spPr>
+          <a:xfrm>
+            <a:off x="8905228" y="5223681"/>
+            <a:ext cx="987771" cy="523220"/>
+          </a:xfrm>
+          <a:prstGeom prst="rect">
+            <a:avLst/>
+          </a:prstGeom>
+          <a:noFill/>
+        </p:spPr>
+        <p:txBody>
+          <a:bodyPr wrap="none" rtlCol="0">
+            <a:spAutoFit/>
+          </a:bodyPr>
+          <a:lstStyle/>
+          <a:p>
+            <a:r>
+              <a:rPr lang="ca-ES" sz="2800" b="1" dirty="0"/>
+              <a:t>Node</a:t>
+            </a:r>
+            <a:endParaRPr lang="es-ES" sz="2800" b="1" dirty="0"/>
+          </a:p>
+        </p:txBody>
+      </p:sp>
+      <p:sp>
+        <p:nvSpPr>
+          <p:cNvPr id="14" name="CuadroTexto 13">
+            <a:extLst>
+              <a:ext uri="{FF2B5EF4-FFF2-40B4-BE49-F238E27FC236}">
+                <a16:creationId xmlns:a16="http://schemas.microsoft.com/office/drawing/2014/main" id="{9161A82D-A686-4891-97C0-0F9A0D104E76}"/>
+              </a:ext>
+            </a:extLst>
+          </p:cNvPr>
+          <p:cNvSpPr txBox="1"/>
+          <p:nvPr/>
+        </p:nvSpPr>
+        <p:spPr>
+          <a:xfrm>
+            <a:off x="4734846" y="6472207"/>
+            <a:ext cx="2373278" cy="400110"/>
+          </a:xfrm>
+          <a:prstGeom prst="rect">
+            <a:avLst/>
+          </a:prstGeom>
+          <a:noFill/>
+        </p:spPr>
+        <p:txBody>
+          <a:bodyPr wrap="none" rtlCol="0">
+            <a:spAutoFit/>
+          </a:bodyPr>
+          <a:lstStyle/>
+          <a:p>
+            <a:r>
+              <a:rPr lang="ca-ES" sz="2000" dirty="0"/>
+              <a:t>nav_msgs/Odometry</a:t>
+            </a:r>
+            <a:endParaRPr lang="es-ES" sz="2000" dirty="0"/>
+          </a:p>
+        </p:txBody>
+      </p:sp>
+      <p:sp>
+        <p:nvSpPr>
+          <p:cNvPr id="23" name="Elipse 22">
+            <a:extLst>
+              <a:ext uri="{FF2B5EF4-FFF2-40B4-BE49-F238E27FC236}">
+                <a16:creationId xmlns:a16="http://schemas.microsoft.com/office/drawing/2014/main" id="{617D49E2-3C3E-4EBD-B410-AE440494B041}"/>
+              </a:ext>
+            </a:extLst>
+          </p:cNvPr>
+          <p:cNvSpPr/>
+          <p:nvPr/>
+        </p:nvSpPr>
+        <p:spPr>
+          <a:xfrm>
+            <a:off x="1368308" y="3375609"/>
+            <a:ext cx="3200400" cy="1809750"/>
+          </a:xfrm>
+          <a:prstGeom prst="ellipse">
+            <a:avLst/>
+          </a:prstGeom>
+          <a:noFill/>
+          <a:ln w="38100"/>
+        </p:spPr>
+        <p:style>
+          <a:lnRef idx="2">
+            <a:schemeClr val="accent1">
+              <a:shade val="50000"/>
+            </a:schemeClr>
+          </a:lnRef>
+          <a:fillRef idx="1">
+            <a:schemeClr val="accent1"/>
+          </a:fillRef>
+          <a:effectRef idx="0">
+            <a:schemeClr val="accent1"/>
+          </a:effectRef>
+          <a:fontRef idx="minor">
+            <a:schemeClr val="lt1"/>
+          </a:fontRef>
+        </p:style>
+        <p:txBody>
+          <a:bodyPr rtlCol="0" anchor="ctr"/>
+          <a:lstStyle/>
+          <a:p>
+            <a:pPr algn="ctr"/>
+            <a:endParaRPr lang="es-ES" dirty="0"/>
+          </a:p>
+        </p:txBody>
+      </p:sp>
+      <p:sp>
+        <p:nvSpPr>
+          <p:cNvPr id="24" name="CuadroTexto 23">
+            <a:extLst>
+              <a:ext uri="{FF2B5EF4-FFF2-40B4-BE49-F238E27FC236}">
+                <a16:creationId xmlns:a16="http://schemas.microsoft.com/office/drawing/2014/main" id="{0D51F148-C3ED-488F-891C-0612BB15BE7C}"/>
+              </a:ext>
+            </a:extLst>
+          </p:cNvPr>
+          <p:cNvSpPr txBox="1"/>
+          <p:nvPr/>
+        </p:nvSpPr>
+        <p:spPr>
+          <a:xfrm>
+            <a:off x="1932594" y="2703015"/>
+            <a:ext cx="987771" cy="523220"/>
+          </a:xfrm>
+          <a:prstGeom prst="rect">
+            <a:avLst/>
+          </a:prstGeom>
+          <a:noFill/>
+        </p:spPr>
+        <p:txBody>
+          <a:bodyPr wrap="none" rtlCol="0">
+            <a:spAutoFit/>
+          </a:bodyPr>
+          <a:lstStyle/>
+          <a:p>
+            <a:r>
+              <a:rPr lang="ca-ES" sz="2800" b="1" dirty="0"/>
+              <a:t>Node</a:t>
+            </a:r>
+            <a:endParaRPr lang="es-ES" sz="2800" b="1" dirty="0"/>
+          </a:p>
+        </p:txBody>
+      </p:sp>
+      <p:sp>
+        <p:nvSpPr>
+          <p:cNvPr id="25" name="CuadroTexto 24">
+            <a:extLst>
+              <a:ext uri="{FF2B5EF4-FFF2-40B4-BE49-F238E27FC236}">
+                <a16:creationId xmlns:a16="http://schemas.microsoft.com/office/drawing/2014/main" id="{C2A1462F-3A2F-49F3-91FD-8F6DAE4CBF17}"/>
+              </a:ext>
+            </a:extLst>
+          </p:cNvPr>
+          <p:cNvSpPr txBox="1"/>
+          <p:nvPr/>
+        </p:nvSpPr>
+        <p:spPr>
+          <a:xfrm>
+            <a:off x="1831991" y="4001525"/>
+            <a:ext cx="1883593" cy="523220"/>
+          </a:xfrm>
+          <a:prstGeom prst="rect">
+            <a:avLst/>
+          </a:prstGeom>
+          <a:noFill/>
+        </p:spPr>
+        <p:txBody>
+          <a:bodyPr wrap="none" rtlCol="0">
+            <a:spAutoFit/>
+          </a:bodyPr>
+          <a:lstStyle/>
+          <a:p>
+            <a:r>
+              <a:rPr lang="ca-ES" sz="2800" b="1" dirty="0">
+                <a:solidFill>
+                  <a:schemeClr val="accent1">
+                    <a:lumMod val="50000"/>
+                  </a:schemeClr>
+                </a:solidFill>
+              </a:rPr>
+              <a:t>/rubot_nav</a:t>
+            </a:r>
+            <a:endParaRPr lang="es-ES" sz="2800" b="1" dirty="0">
+              <a:solidFill>
+                <a:schemeClr val="accent1">
+                  <a:lumMod val="50000"/>
+                </a:schemeClr>
+              </a:solidFill>
+            </a:endParaRPr>
+          </a:p>
+        </p:txBody>
+      </p:sp>
+      <p:sp>
+        <p:nvSpPr>
+          <p:cNvPr id="9" name="Arco 8">
+            <a:extLst>
+              <a:ext uri="{FF2B5EF4-FFF2-40B4-BE49-F238E27FC236}">
+                <a16:creationId xmlns:a16="http://schemas.microsoft.com/office/drawing/2014/main" id="{4EF9ABCA-B3F2-4552-B45F-5E1D4718C8CD}"/>
+              </a:ext>
+            </a:extLst>
+          </p:cNvPr>
+          <p:cNvSpPr/>
+          <p:nvPr/>
+        </p:nvSpPr>
+        <p:spPr>
+          <a:xfrm>
+            <a:off x="3320177" y="4051176"/>
+            <a:ext cx="4905829" cy="2250421"/>
+          </a:xfrm>
+          <a:prstGeom prst="arc">
+            <a:avLst>
+              <a:gd name="adj1" fmla="val 21571653"/>
+              <a:gd name="adj2" fmla="val 10781742"/>
+            </a:avLst>
+          </a:prstGeom>
+          <a:noFill/>
+          <a:ln w="57150">
+            <a:solidFill>
+              <a:srgbClr val="FF0000"/>
+            </a:solidFill>
+            <a:headEnd type="none" w="med" len="med"/>
+            <a:tailEnd type="triangle" w="med" len="med"/>
+          </a:ln>
+        </p:spPr>
+        <p:style>
+          <a:lnRef idx="1">
+            <a:schemeClr val="accent1"/>
+          </a:lnRef>
+          <a:fillRef idx="0">
+            <a:schemeClr val="accent1"/>
+          </a:fillRef>
+          <a:effectRef idx="0">
+            <a:schemeClr val="accent1"/>
+          </a:effectRef>
+          <a:fontRef idx="minor">
+            <a:schemeClr val="tx1"/>
+          </a:fontRef>
+        </p:style>
+        <p:txBody>
+          <a:bodyPr rtlCol="0" anchor="ctr"/>
+          <a:lstStyle/>
+          <a:p>
+            <a:pPr algn="ctr"/>
+            <a:endParaRPr lang="es-ES"/>
+          </a:p>
+        </p:txBody>
+      </p:sp>
+      <p:sp>
+        <p:nvSpPr>
+          <p:cNvPr id="26" name="CuadroTexto 25">
+            <a:extLst>
+              <a:ext uri="{FF2B5EF4-FFF2-40B4-BE49-F238E27FC236}">
+                <a16:creationId xmlns:a16="http://schemas.microsoft.com/office/drawing/2014/main" id="{C6402B58-9AE2-459C-9825-2A767E75ED13}"/>
+              </a:ext>
+            </a:extLst>
+          </p:cNvPr>
+          <p:cNvSpPr txBox="1"/>
+          <p:nvPr/>
+        </p:nvSpPr>
+        <p:spPr>
+          <a:xfrm>
+            <a:off x="5099008" y="3639254"/>
+            <a:ext cx="1381340" cy="461665"/>
+          </a:xfrm>
+          <a:prstGeom prst="rect">
+            <a:avLst/>
+          </a:prstGeom>
+          <a:noFill/>
+        </p:spPr>
+        <p:txBody>
+          <a:bodyPr wrap="none" rtlCol="0">
+            <a:spAutoFit/>
+          </a:bodyPr>
+          <a:lstStyle/>
+          <a:p>
+            <a:r>
+              <a:rPr lang="ca-ES" sz="2400" b="1" dirty="0">
+                <a:solidFill>
+                  <a:srgbClr val="FF0000"/>
+                </a:solidFill>
+              </a:rPr>
+              <a:t>/cmd_vel</a:t>
+            </a:r>
+            <a:endParaRPr lang="es-ES" sz="2400" b="1" dirty="0">
+              <a:solidFill>
+                <a:srgbClr val="FF0000"/>
+              </a:solidFill>
+            </a:endParaRPr>
+          </a:p>
+        </p:txBody>
+      </p:sp>
+      <p:sp>
+        <p:nvSpPr>
+          <p:cNvPr id="27" name="CuadroTexto 26">
+            <a:extLst>
+              <a:ext uri="{FF2B5EF4-FFF2-40B4-BE49-F238E27FC236}">
+                <a16:creationId xmlns:a16="http://schemas.microsoft.com/office/drawing/2014/main" id="{CDF0E9AF-3744-422D-ADA7-52A62D6E81DF}"/>
+              </a:ext>
+            </a:extLst>
+          </p:cNvPr>
+          <p:cNvSpPr txBox="1"/>
+          <p:nvPr/>
+        </p:nvSpPr>
+        <p:spPr>
+          <a:xfrm>
+            <a:off x="4532542" y="4545370"/>
+            <a:ext cx="2310441" cy="369332"/>
+          </a:xfrm>
+          <a:prstGeom prst="rect">
+            <a:avLst/>
+          </a:prstGeom>
+          <a:noFill/>
+        </p:spPr>
+        <p:txBody>
+          <a:bodyPr wrap="none" rtlCol="0">
+            <a:spAutoFit/>
+          </a:bodyPr>
+          <a:lstStyle/>
+          <a:p>
+            <a:r>
+              <a:rPr lang="ca-ES" dirty="0"/>
+              <a:t>geometry_msgs/Twist</a:t>
+            </a:r>
+            <a:endParaRPr lang="es-ES" dirty="0"/>
+          </a:p>
+        </p:txBody>
+      </p:sp>
+      <p:sp>
+        <p:nvSpPr>
+          <p:cNvPr id="15" name="CuadroTexto 14">
+            <a:extLst>
+              <a:ext uri="{FF2B5EF4-FFF2-40B4-BE49-F238E27FC236}">
+                <a16:creationId xmlns:a16="http://schemas.microsoft.com/office/drawing/2014/main" id="{43AC39FF-DED9-4062-8E76-BF580CA6E0A5}"/>
+              </a:ext>
+            </a:extLst>
+          </p:cNvPr>
+          <p:cNvSpPr txBox="1"/>
+          <p:nvPr/>
+        </p:nvSpPr>
+        <p:spPr>
+          <a:xfrm>
+            <a:off x="7678822" y="3987114"/>
+            <a:ext cx="1309974" cy="584775"/>
+          </a:xfrm>
+          <a:prstGeom prst="rect">
+            <a:avLst/>
+          </a:prstGeom>
+          <a:noFill/>
+        </p:spPr>
+        <p:txBody>
+          <a:bodyPr wrap="none" rtlCol="0">
+            <a:spAutoFit/>
+          </a:bodyPr>
+          <a:lstStyle/>
+          <a:p>
+            <a:r>
+              <a:rPr lang="ca-ES" sz="3200" b="1" dirty="0">
+                <a:solidFill>
+                  <a:schemeClr val="accent1">
+                    <a:lumMod val="50000"/>
+                  </a:schemeClr>
+                </a:solidFill>
+              </a:rPr>
+              <a:t>/</a:t>
+            </a:r>
+            <a:r>
+              <a:rPr lang="ca-ES" sz="3200" b="1" dirty="0" err="1">
+                <a:solidFill>
+                  <a:schemeClr val="accent1">
+                    <a:lumMod val="50000"/>
+                  </a:schemeClr>
+                </a:solidFill>
+              </a:rPr>
+              <a:t>rubot</a:t>
+            </a:r>
+            <a:endParaRPr lang="es-ES" sz="3200" b="1" dirty="0">
+              <a:solidFill>
+                <a:schemeClr val="accent1">
+                  <a:lumMod val="50000"/>
+                </a:schemeClr>
+              </a:solidFill>
+            </a:endParaRPr>
+          </a:p>
+        </p:txBody>
+      </p:sp>
+      <p:sp>
+        <p:nvSpPr>
+          <p:cNvPr id="17" name="CuadroTexto 16">
+            <a:extLst>
+              <a:ext uri="{FF2B5EF4-FFF2-40B4-BE49-F238E27FC236}">
+                <a16:creationId xmlns:a16="http://schemas.microsoft.com/office/drawing/2014/main" id="{0A5652C3-853E-4BBE-98E5-DF7984664825}"/>
+              </a:ext>
+            </a:extLst>
+          </p:cNvPr>
+          <p:cNvSpPr txBox="1"/>
+          <p:nvPr/>
+        </p:nvSpPr>
+        <p:spPr>
+          <a:xfrm>
+            <a:off x="4966424" y="1712132"/>
+            <a:ext cx="876715" cy="461665"/>
+          </a:xfrm>
+          <a:prstGeom prst="rect">
+            <a:avLst/>
+          </a:prstGeom>
+          <a:noFill/>
+        </p:spPr>
+        <p:txBody>
+          <a:bodyPr wrap="none" rtlCol="0">
+            <a:spAutoFit/>
+          </a:bodyPr>
+          <a:lstStyle/>
+          <a:p>
+            <a:r>
+              <a:rPr lang="ca-ES" sz="2400" b="1" dirty="0">
+                <a:solidFill>
+                  <a:srgbClr val="FF0000"/>
+                </a:solidFill>
+              </a:rPr>
+              <a:t>/scan</a:t>
+            </a:r>
+            <a:endParaRPr lang="es-ES" sz="2400" b="1" dirty="0">
+              <a:solidFill>
+                <a:srgbClr val="FF0000"/>
+              </a:solidFill>
+            </a:endParaRPr>
+          </a:p>
+        </p:txBody>
+      </p:sp>
+      <p:sp>
+        <p:nvSpPr>
+          <p:cNvPr id="18" name="CuadroTexto 17">
+            <a:extLst>
+              <a:ext uri="{FF2B5EF4-FFF2-40B4-BE49-F238E27FC236}">
+                <a16:creationId xmlns:a16="http://schemas.microsoft.com/office/drawing/2014/main" id="{5526D06D-79C5-4147-AA0E-5077FCD686B4}"/>
+              </a:ext>
+            </a:extLst>
+          </p:cNvPr>
+          <p:cNvSpPr txBox="1"/>
+          <p:nvPr/>
+        </p:nvSpPr>
+        <p:spPr>
+          <a:xfrm>
+            <a:off x="4027856" y="2564515"/>
+            <a:ext cx="2726516" cy="400110"/>
+          </a:xfrm>
+          <a:prstGeom prst="rect">
+            <a:avLst/>
+          </a:prstGeom>
+          <a:noFill/>
+        </p:spPr>
+        <p:txBody>
+          <a:bodyPr wrap="none" rtlCol="0">
+            <a:spAutoFit/>
+          </a:bodyPr>
+          <a:lstStyle/>
+          <a:p>
+            <a:r>
+              <a:rPr lang="ca-ES" sz="2000" dirty="0"/>
+              <a:t>sensor_msgs/LaserScan</a:t>
+            </a:r>
+            <a:endParaRPr lang="es-ES" sz="2000" dirty="0"/>
+          </a:p>
+        </p:txBody>
+      </p:sp>
+      <p:sp>
+        <p:nvSpPr>
+          <p:cNvPr id="19" name="Arco 18">
+            <a:extLst>
+              <a:ext uri="{FF2B5EF4-FFF2-40B4-BE49-F238E27FC236}">
+                <a16:creationId xmlns:a16="http://schemas.microsoft.com/office/drawing/2014/main" id="{4C67B744-A8C6-46AF-A306-09BCD63B4C2E}"/>
+              </a:ext>
+            </a:extLst>
+          </p:cNvPr>
+          <p:cNvSpPr/>
+          <p:nvPr/>
+        </p:nvSpPr>
+        <p:spPr>
+          <a:xfrm flipV="1">
+            <a:off x="3390225" y="2280748"/>
+            <a:ext cx="4905829" cy="2250421"/>
+          </a:xfrm>
+          <a:prstGeom prst="arc">
+            <a:avLst>
+              <a:gd name="adj1" fmla="val 3083598"/>
+              <a:gd name="adj2" fmla="val 10781742"/>
+            </a:avLst>
+          </a:prstGeom>
+          <a:noFill/>
+          <a:ln w="57150">
+            <a:solidFill>
+              <a:srgbClr val="FF0000"/>
+            </a:solidFill>
+            <a:headEnd type="none" w="med" len="med"/>
+            <a:tailEnd type="triangle" w="med" len="med"/>
+          </a:ln>
+        </p:spPr>
+        <p:style>
+          <a:lnRef idx="1">
+            <a:schemeClr val="accent1"/>
+          </a:lnRef>
+          <a:fillRef idx="0">
+            <a:schemeClr val="accent1"/>
+          </a:fillRef>
+          <a:effectRef idx="0">
+            <a:schemeClr val="accent1"/>
+          </a:effectRef>
+          <a:fontRef idx="minor">
+            <a:schemeClr val="tx1"/>
+          </a:fontRef>
+        </p:style>
+        <p:txBody>
+          <a:bodyPr rtlCol="0" anchor="ctr"/>
+          <a:lstStyle/>
+          <a:p>
+            <a:pPr algn="ctr"/>
+            <a:endParaRPr lang="es-ES"/>
+          </a:p>
+        </p:txBody>
+      </p:sp>
+      <p:sp>
+        <p:nvSpPr>
+          <p:cNvPr id="20" name="Elipse 19">
+            <a:extLst>
+              <a:ext uri="{FF2B5EF4-FFF2-40B4-BE49-F238E27FC236}">
+                <a16:creationId xmlns:a16="http://schemas.microsoft.com/office/drawing/2014/main" id="{DCE4CD81-C09A-4AEC-89F4-237A3D68F86D}"/>
+              </a:ext>
+            </a:extLst>
+          </p:cNvPr>
+          <p:cNvSpPr/>
+          <p:nvPr/>
+        </p:nvSpPr>
+        <p:spPr>
+          <a:xfrm>
+            <a:off x="6668216" y="1761912"/>
+            <a:ext cx="2291079" cy="1430905"/>
+          </a:xfrm>
+          <a:prstGeom prst="ellipse">
+            <a:avLst/>
+          </a:prstGeom>
+          <a:noFill/>
+          <a:ln w="38100"/>
+        </p:spPr>
+        <p:style>
+          <a:lnRef idx="2">
+            <a:schemeClr val="accent1">
+              <a:shade val="50000"/>
+            </a:schemeClr>
+          </a:lnRef>
+          <a:fillRef idx="1">
+            <a:schemeClr val="accent1"/>
+          </a:fillRef>
+          <a:effectRef idx="0">
+            <a:schemeClr val="accent1"/>
+          </a:effectRef>
+          <a:fontRef idx="minor">
+            <a:schemeClr val="lt1"/>
+          </a:fontRef>
+        </p:style>
+        <p:txBody>
+          <a:bodyPr rtlCol="0" anchor="ctr"/>
+          <a:lstStyle/>
+          <a:p>
+            <a:pPr algn="ctr"/>
+            <a:endParaRPr lang="es-ES" dirty="0"/>
+          </a:p>
+        </p:txBody>
+      </p:sp>
+      <p:sp>
+        <p:nvSpPr>
+          <p:cNvPr id="2" name="CuadroTexto 1">
+            <a:extLst>
+              <a:ext uri="{FF2B5EF4-FFF2-40B4-BE49-F238E27FC236}">
+                <a16:creationId xmlns:a16="http://schemas.microsoft.com/office/drawing/2014/main" id="{AB3A1AF0-3ED5-442C-8DF2-A8AD170DB81F}"/>
+              </a:ext>
+            </a:extLst>
+          </p:cNvPr>
+          <p:cNvSpPr txBox="1"/>
+          <p:nvPr/>
+        </p:nvSpPr>
+        <p:spPr>
+          <a:xfrm>
+            <a:off x="6893317" y="2172683"/>
+            <a:ext cx="2007024" cy="461665"/>
+          </a:xfrm>
+          <a:prstGeom prst="rect">
+            <a:avLst/>
+          </a:prstGeom>
+          <a:noFill/>
+        </p:spPr>
+        <p:txBody>
+          <a:bodyPr wrap="none" rtlCol="0">
+            <a:spAutoFit/>
+          </a:bodyPr>
+          <a:lstStyle/>
+          <a:p>
+            <a:r>
+              <a:rPr lang="ca-ES" sz="2400" b="1" dirty="0"/>
+              <a:t>/ydlidar_node</a:t>
+            </a:r>
+            <a:endParaRPr lang="es-ES" sz="2400" b="1" dirty="0"/>
+          </a:p>
+        </p:txBody>
+      </p:sp>
+      <p:sp>
+        <p:nvSpPr>
+          <p:cNvPr id="21" name="CuadroTexto 20">
+            <a:extLst>
+              <a:ext uri="{FF2B5EF4-FFF2-40B4-BE49-F238E27FC236}">
+                <a16:creationId xmlns:a16="http://schemas.microsoft.com/office/drawing/2014/main" id="{C5051B2E-AB43-47B5-A1F6-3DA219C8F200}"/>
+              </a:ext>
+            </a:extLst>
+          </p:cNvPr>
+          <p:cNvSpPr txBox="1"/>
+          <p:nvPr/>
+        </p:nvSpPr>
+        <p:spPr>
+          <a:xfrm>
+            <a:off x="9121130" y="2203696"/>
+            <a:ext cx="987771" cy="523220"/>
+          </a:xfrm>
+          <a:prstGeom prst="rect">
+            <a:avLst/>
+          </a:prstGeom>
+          <a:noFill/>
+        </p:spPr>
+        <p:txBody>
+          <a:bodyPr wrap="none" rtlCol="0">
+            <a:spAutoFit/>
+          </a:bodyPr>
+          <a:lstStyle/>
+          <a:p>
+            <a:r>
+              <a:rPr lang="ca-ES" sz="2800" b="1" dirty="0"/>
+              <a:t>Node</a:t>
+            </a:r>
+            <a:endParaRPr lang="es-ES" sz="2800" b="1" dirty="0"/>
+          </a:p>
+        </p:txBody>
+      </p:sp>
+      <p:sp>
+        <p:nvSpPr>
+          <p:cNvPr id="22" name="Elipse 21">
+            <a:extLst>
+              <a:ext uri="{FF2B5EF4-FFF2-40B4-BE49-F238E27FC236}">
+                <a16:creationId xmlns:a16="http://schemas.microsoft.com/office/drawing/2014/main" id="{287632C9-86C9-4E3B-B8AF-6B50E08FB857}"/>
+              </a:ext>
+            </a:extLst>
+          </p:cNvPr>
+          <p:cNvSpPr/>
+          <p:nvPr/>
+        </p:nvSpPr>
+        <p:spPr>
+          <a:xfrm>
+            <a:off x="6700955" y="92973"/>
+            <a:ext cx="2291079" cy="1430905"/>
+          </a:xfrm>
+          <a:prstGeom prst="ellipse">
+            <a:avLst/>
+          </a:prstGeom>
+          <a:noFill/>
+          <a:ln w="38100"/>
+        </p:spPr>
+        <p:style>
+          <a:lnRef idx="2">
+            <a:schemeClr val="accent1">
+              <a:shade val="50000"/>
+            </a:schemeClr>
+          </a:lnRef>
+          <a:fillRef idx="1">
+            <a:schemeClr val="accent1"/>
+          </a:fillRef>
+          <a:effectRef idx="0">
+            <a:schemeClr val="accent1"/>
+          </a:effectRef>
+          <a:fontRef idx="minor">
+            <a:schemeClr val="lt1"/>
+          </a:fontRef>
+        </p:style>
+        <p:txBody>
+          <a:bodyPr rtlCol="0" anchor="ctr"/>
+          <a:lstStyle/>
+          <a:p>
+            <a:pPr algn="ctr"/>
+            <a:endParaRPr lang="es-ES" dirty="0"/>
+          </a:p>
+        </p:txBody>
+      </p:sp>
+      <p:sp>
+        <p:nvSpPr>
+          <p:cNvPr id="28" name="CuadroTexto 27">
+            <a:extLst>
+              <a:ext uri="{FF2B5EF4-FFF2-40B4-BE49-F238E27FC236}">
+                <a16:creationId xmlns:a16="http://schemas.microsoft.com/office/drawing/2014/main" id="{C7B3A669-0D52-43CF-BFD3-9E36671C979A}"/>
+              </a:ext>
+            </a:extLst>
+          </p:cNvPr>
+          <p:cNvSpPr txBox="1"/>
+          <p:nvPr/>
+        </p:nvSpPr>
+        <p:spPr>
+          <a:xfrm>
+            <a:off x="6722374" y="544301"/>
+            <a:ext cx="2269660" cy="461665"/>
+          </a:xfrm>
+          <a:prstGeom prst="rect">
+            <a:avLst/>
+          </a:prstGeom>
+          <a:noFill/>
+        </p:spPr>
+        <p:txBody>
+          <a:bodyPr wrap="none" rtlCol="0">
+            <a:spAutoFit/>
+          </a:bodyPr>
+          <a:lstStyle/>
+          <a:p>
+            <a:r>
+              <a:rPr lang="ca-ES" sz="2400" b="1" dirty="0"/>
+              <a:t>/raspicam_node</a:t>
+            </a:r>
+            <a:endParaRPr lang="es-ES" sz="2400" b="1" dirty="0"/>
+          </a:p>
+        </p:txBody>
+      </p:sp>
+      <p:sp>
+        <p:nvSpPr>
+          <p:cNvPr id="29" name="CuadroTexto 28">
+            <a:extLst>
+              <a:ext uri="{FF2B5EF4-FFF2-40B4-BE49-F238E27FC236}">
+                <a16:creationId xmlns:a16="http://schemas.microsoft.com/office/drawing/2014/main" id="{446F2EA0-6672-48AA-AB7C-46254754C3AC}"/>
+              </a:ext>
+            </a:extLst>
+          </p:cNvPr>
+          <p:cNvSpPr txBox="1"/>
+          <p:nvPr/>
+        </p:nvSpPr>
+        <p:spPr>
+          <a:xfrm>
+            <a:off x="9172961" y="578776"/>
+            <a:ext cx="987771" cy="523220"/>
+          </a:xfrm>
+          <a:prstGeom prst="rect">
+            <a:avLst/>
+          </a:prstGeom>
+          <a:noFill/>
+        </p:spPr>
+        <p:txBody>
+          <a:bodyPr wrap="none" rtlCol="0">
+            <a:spAutoFit/>
+          </a:bodyPr>
+          <a:lstStyle/>
+          <a:p>
+            <a:r>
+              <a:rPr lang="ca-ES" sz="2800" b="1" dirty="0"/>
+              <a:t>Node</a:t>
+            </a:r>
+            <a:endParaRPr lang="es-ES" sz="2800" b="1" dirty="0"/>
+          </a:p>
+        </p:txBody>
+      </p:sp>
+      <p:sp>
+        <p:nvSpPr>
+          <p:cNvPr id="30" name="CuadroTexto 29">
+            <a:extLst>
+              <a:ext uri="{FF2B5EF4-FFF2-40B4-BE49-F238E27FC236}">
+                <a16:creationId xmlns:a16="http://schemas.microsoft.com/office/drawing/2014/main" id="{E0806900-E02C-4F19-9DF4-14F27003E0A9}"/>
+              </a:ext>
+            </a:extLst>
+          </p:cNvPr>
+          <p:cNvSpPr txBox="1"/>
+          <p:nvPr/>
+        </p:nvSpPr>
+        <p:spPr>
+          <a:xfrm>
+            <a:off x="4771164" y="163122"/>
+            <a:ext cx="1728678" cy="461665"/>
+          </a:xfrm>
+          <a:prstGeom prst="rect">
+            <a:avLst/>
+          </a:prstGeom>
+          <a:noFill/>
+        </p:spPr>
+        <p:txBody>
+          <a:bodyPr wrap="none" rtlCol="0">
+            <a:spAutoFit/>
+          </a:bodyPr>
+          <a:lstStyle/>
+          <a:p>
+            <a:r>
+              <a:rPr lang="ca-ES" sz="2400" b="1" dirty="0">
+                <a:solidFill>
+                  <a:srgbClr val="FF0000"/>
+                </a:solidFill>
+              </a:rPr>
+              <a:t>/image_raw</a:t>
+            </a:r>
+            <a:endParaRPr lang="es-ES" sz="2400" b="1" dirty="0">
+              <a:solidFill>
+                <a:srgbClr val="FF0000"/>
+              </a:solidFill>
+            </a:endParaRPr>
+          </a:p>
+        </p:txBody>
+      </p:sp>
+      <p:sp>
+        <p:nvSpPr>
+          <p:cNvPr id="31" name="CuadroTexto 30">
+            <a:extLst>
+              <a:ext uri="{FF2B5EF4-FFF2-40B4-BE49-F238E27FC236}">
+                <a16:creationId xmlns:a16="http://schemas.microsoft.com/office/drawing/2014/main" id="{A5C2C63E-D55D-4C7A-9653-D20F4FAA4E3E}"/>
+              </a:ext>
+            </a:extLst>
+          </p:cNvPr>
+          <p:cNvSpPr txBox="1"/>
+          <p:nvPr/>
+        </p:nvSpPr>
+        <p:spPr>
+          <a:xfrm>
+            <a:off x="4553733" y="1009018"/>
+            <a:ext cx="2268057" cy="400110"/>
+          </a:xfrm>
+          <a:prstGeom prst="rect">
+            <a:avLst/>
+          </a:prstGeom>
+          <a:noFill/>
+        </p:spPr>
+        <p:txBody>
+          <a:bodyPr wrap="none" rtlCol="0">
+            <a:spAutoFit/>
+          </a:bodyPr>
+          <a:lstStyle/>
+          <a:p>
+            <a:r>
+              <a:rPr lang="ca-ES" sz="2000" dirty="0"/>
+              <a:t>sensor_msgs/Image</a:t>
+            </a:r>
+            <a:endParaRPr lang="es-ES" sz="2000" dirty="0"/>
+          </a:p>
+        </p:txBody>
+      </p:sp>
+      <p:sp>
+        <p:nvSpPr>
+          <p:cNvPr id="32" name="Arco 31">
+            <a:extLst>
+              <a:ext uri="{FF2B5EF4-FFF2-40B4-BE49-F238E27FC236}">
+                <a16:creationId xmlns:a16="http://schemas.microsoft.com/office/drawing/2014/main" id="{FE6BBB4D-293B-4F9C-AE38-FE43E7060468}"/>
+              </a:ext>
+            </a:extLst>
+          </p:cNvPr>
+          <p:cNvSpPr/>
+          <p:nvPr/>
+        </p:nvSpPr>
+        <p:spPr>
+          <a:xfrm flipV="1">
+            <a:off x="2978093" y="725212"/>
+            <a:ext cx="6914906" cy="5066507"/>
+          </a:xfrm>
+          <a:prstGeom prst="arc">
+            <a:avLst>
+              <a:gd name="adj1" fmla="val 5013535"/>
+              <a:gd name="adj2" fmla="val 10913513"/>
+            </a:avLst>
+          </a:prstGeom>
+          <a:noFill/>
+          <a:ln w="57150">
+            <a:solidFill>
+              <a:srgbClr val="FF0000"/>
+            </a:solidFill>
+            <a:headEnd type="none" w="med" len="med"/>
+            <a:tailEnd type="triangle" w="med" len="med"/>
+          </a:ln>
+        </p:spPr>
+        <p:style>
+          <a:lnRef idx="1">
+            <a:schemeClr val="accent1"/>
+          </a:lnRef>
+          <a:fillRef idx="0">
+            <a:schemeClr val="accent1"/>
+          </a:fillRef>
+          <a:effectRef idx="0">
+            <a:schemeClr val="accent1"/>
+          </a:effectRef>
+          <a:fontRef idx="minor">
+            <a:schemeClr val="tx1"/>
+          </a:fontRef>
+        </p:style>
+        <p:txBody>
+          <a:bodyPr rtlCol="0" anchor="ctr"/>
+          <a:lstStyle/>
+          <a:p>
+            <a:pPr algn="ctr"/>
+            <a:endParaRPr lang="es-ES"/>
+          </a:p>
+        </p:txBody>
+      </p:sp>
+    </p:spTree>
+    <p:extLst>
+      <p:ext uri="{BB962C8B-B14F-4D97-AF65-F5344CB8AC3E}">
+        <p14:creationId xmlns:p14="http://schemas.microsoft.com/office/powerpoint/2010/main" val="3994424521"/>
+      </p:ext>
+    </p:extLst>
+  </p:cSld>
+  <p:clrMapOvr>
+    <a:masterClrMapping/>
+  </p:clrMapOvr>
+</p:sld>
+</file>
+
 <file path=ppt/theme/theme1.xml><?xml version="1.0" encoding="utf-8"?>
 <a:theme xmlns:a="http://schemas.openxmlformats.org/drawingml/2006/main" name="Tema de Office">
   <a:themeElements>

</xml_diff>